<commit_message>
small change to the slides
</commit_message>
<xml_diff>
--- a/Machine_Learning_in_Finance_Gruppenarbeit_Gruppe1_V1.pptx
+++ b/Machine_Learning_in_Finance_Gruppenarbeit_Gruppe1_V1.pptx
@@ -276,14 +276,14 @@
           <a:effectLst/>
           <a:extLst>
             <a:ext uri="{909E8E84-426E-40dd-AFC4-6F175D3DCCD1}">
-              <a14:hiddenFill xmlns:a14="http://schemas.microsoft.com/office/drawing/2010/main" xmlns="">
+              <a14:hiddenFill xmlns="" xmlns:a14="http://schemas.microsoft.com/office/drawing/2010/main">
                 <a:solidFill>
                   <a:schemeClr val="accent1"/>
                 </a:solidFill>
               </a14:hiddenFill>
             </a:ext>
             <a:ext uri="{91240B29-F687-4f45-9708-019B960494DF}">
-              <a14:hiddenLine xmlns:a14="http://schemas.microsoft.com/office/drawing/2010/main" xmlns="" w="9525">
+              <a14:hiddenLine xmlns="" xmlns:a14="http://schemas.microsoft.com/office/drawing/2010/main" w="9525">
                 <a:solidFill>
                   <a:schemeClr val="tx1"/>
                 </a:solidFill>
@@ -293,7 +293,7 @@
               </a14:hiddenLine>
             </a:ext>
             <a:ext uri="{AF507438-7753-43e0-B8FC-AC1667EBCBE1}">
-              <a14:hiddenEffects xmlns:a14="http://schemas.microsoft.com/office/drawing/2010/main" xmlns="">
+              <a14:hiddenEffects xmlns="" xmlns:a14="http://schemas.microsoft.com/office/drawing/2010/main">
                 <a:effectLst>
                   <a:outerShdw blurRad="63500" dist="38099" dir="2700000" algn="ctr" rotWithShape="0">
                     <a:schemeClr val="bg2">
@@ -304,7 +304,7 @@
               </a14:hiddenEffects>
             </a:ext>
             <a:ext uri="{FAA26D3D-D897-4be2-8F04-BA451C77F1D7}">
-              <ma14:placeholderFlag xmlns:ma14="http://schemas.microsoft.com/office/mac/drawingml/2011/main" xmlns="" val="1"/>
+              <ma14:placeholderFlag xmlns="" xmlns:ma14="http://schemas.microsoft.com/office/mac/drawingml/2011/main" val="1"/>
             </a:ext>
           </a:extLst>
         </p:spPr>
@@ -349,14 +349,14 @@
           <a:effectLst/>
           <a:extLst>
             <a:ext uri="{909E8E84-426E-40dd-AFC4-6F175D3DCCD1}">
-              <a14:hiddenFill xmlns:a14="http://schemas.microsoft.com/office/drawing/2010/main" xmlns="">
+              <a14:hiddenFill xmlns="" xmlns:a14="http://schemas.microsoft.com/office/drawing/2010/main">
                 <a:solidFill>
                   <a:schemeClr val="accent1"/>
                 </a:solidFill>
               </a14:hiddenFill>
             </a:ext>
             <a:ext uri="{91240B29-F687-4f45-9708-019B960494DF}">
-              <a14:hiddenLine xmlns:a14="http://schemas.microsoft.com/office/drawing/2010/main" xmlns="" w="9525">
+              <a14:hiddenLine xmlns="" xmlns:a14="http://schemas.microsoft.com/office/drawing/2010/main" w="9525">
                 <a:solidFill>
                   <a:schemeClr val="tx1"/>
                 </a:solidFill>
@@ -366,7 +366,7 @@
               </a14:hiddenLine>
             </a:ext>
             <a:ext uri="{AF507438-7753-43e0-B8FC-AC1667EBCBE1}">
-              <a14:hiddenEffects xmlns:a14="http://schemas.microsoft.com/office/drawing/2010/main" xmlns="">
+              <a14:hiddenEffects xmlns="" xmlns:a14="http://schemas.microsoft.com/office/drawing/2010/main">
                 <a:effectLst>
                   <a:outerShdw blurRad="63500" dist="38099" dir="2700000" algn="ctr" rotWithShape="0">
                     <a:schemeClr val="bg2">
@@ -377,7 +377,7 @@
               </a14:hiddenEffects>
             </a:ext>
             <a:ext uri="{FAA26D3D-D897-4be2-8F04-BA451C77F1D7}">
-              <ma14:placeholderFlag xmlns:ma14="http://schemas.microsoft.com/office/mac/drawingml/2011/main" xmlns="" val="1"/>
+              <ma14:placeholderFlag xmlns="" xmlns:ma14="http://schemas.microsoft.com/office/mac/drawingml/2011/main" val="1"/>
             </a:ext>
           </a:extLst>
         </p:spPr>
@@ -427,7 +427,7 @@
           <a:effectLst/>
           <a:extLst>
             <a:ext uri="{AF507438-7753-43e0-B8FC-AC1667EBCBE1}">
-              <a14:hiddenEffects xmlns:a14="http://schemas.microsoft.com/office/drawing/2010/main" xmlns="">
+              <a14:hiddenEffects xmlns="" xmlns:a14="http://schemas.microsoft.com/office/drawing/2010/main">
                 <a:effectLst>
                   <a:outerShdw blurRad="63500" dist="38099" dir="2700000" algn="ctr" rotWithShape="0">
                     <a:srgbClr val="000000">
@@ -438,7 +438,7 @@
               </a14:hiddenEffects>
             </a:ext>
             <a:ext uri="{53640926-AAD7-44d8-BBD7-CCE9431645EC}">
-              <a14:shadowObscured xmlns:a14="http://schemas.microsoft.com/office/drawing/2010/main" xmlns="" val="1"/>
+              <a14:shadowObscured xmlns="" xmlns:a14="http://schemas.microsoft.com/office/drawing/2010/main" val="1"/>
             </a:ext>
           </a:extLst>
         </p:spPr>
@@ -468,14 +468,14 @@
           <a:effectLst/>
           <a:extLst>
             <a:ext uri="{909E8E84-426E-40dd-AFC4-6F175D3DCCD1}">
-              <a14:hiddenFill xmlns:a14="http://schemas.microsoft.com/office/drawing/2010/main" xmlns="">
+              <a14:hiddenFill xmlns="" xmlns:a14="http://schemas.microsoft.com/office/drawing/2010/main">
                 <a:solidFill>
                   <a:schemeClr val="accent1"/>
                 </a:solidFill>
               </a14:hiddenFill>
             </a:ext>
             <a:ext uri="{91240B29-F687-4f45-9708-019B960494DF}">
-              <a14:hiddenLine xmlns:a14="http://schemas.microsoft.com/office/drawing/2010/main" xmlns="" w="9525">
+              <a14:hiddenLine xmlns="" xmlns:a14="http://schemas.microsoft.com/office/drawing/2010/main" w="9525">
                 <a:solidFill>
                   <a:schemeClr val="tx1"/>
                 </a:solidFill>
@@ -485,7 +485,7 @@
               </a14:hiddenLine>
             </a:ext>
             <a:ext uri="{AF507438-7753-43e0-B8FC-AC1667EBCBE1}">
-              <a14:hiddenEffects xmlns:a14="http://schemas.microsoft.com/office/drawing/2010/main" xmlns="">
+              <a14:hiddenEffects xmlns="" xmlns:a14="http://schemas.microsoft.com/office/drawing/2010/main">
                 <a:effectLst>
                   <a:outerShdw blurRad="63500" dist="38099" dir="2700000" algn="ctr" rotWithShape="0">
                     <a:schemeClr val="bg2">
@@ -496,7 +496,7 @@
               </a14:hiddenEffects>
             </a:ext>
             <a:ext uri="{FAA26D3D-D897-4be2-8F04-BA451C77F1D7}">
-              <ma14:placeholderFlag xmlns:ma14="http://schemas.microsoft.com/office/mac/drawingml/2011/main" xmlns="" val="1"/>
+              <ma14:placeholderFlag xmlns="" xmlns:ma14="http://schemas.microsoft.com/office/mac/drawingml/2011/main" val="1"/>
             </a:ext>
           </a:extLst>
         </p:spPr>
@@ -569,14 +569,14 @@
           <a:effectLst/>
           <a:extLst>
             <a:ext uri="{909E8E84-426E-40dd-AFC4-6F175D3DCCD1}">
-              <a14:hiddenFill xmlns:a14="http://schemas.microsoft.com/office/drawing/2010/main" xmlns="">
+              <a14:hiddenFill xmlns="" xmlns:a14="http://schemas.microsoft.com/office/drawing/2010/main">
                 <a:solidFill>
                   <a:schemeClr val="accent1"/>
                 </a:solidFill>
               </a14:hiddenFill>
             </a:ext>
             <a:ext uri="{91240B29-F687-4f45-9708-019B960494DF}">
-              <a14:hiddenLine xmlns:a14="http://schemas.microsoft.com/office/drawing/2010/main" xmlns="" w="9525">
+              <a14:hiddenLine xmlns="" xmlns:a14="http://schemas.microsoft.com/office/drawing/2010/main" w="9525">
                 <a:solidFill>
                   <a:schemeClr val="tx1"/>
                 </a:solidFill>
@@ -586,7 +586,7 @@
               </a14:hiddenLine>
             </a:ext>
             <a:ext uri="{AF507438-7753-43e0-B8FC-AC1667EBCBE1}">
-              <a14:hiddenEffects xmlns:a14="http://schemas.microsoft.com/office/drawing/2010/main" xmlns="">
+              <a14:hiddenEffects xmlns="" xmlns:a14="http://schemas.microsoft.com/office/drawing/2010/main">
                 <a:effectLst>
                   <a:outerShdw blurRad="63500" dist="38099" dir="2700000" algn="ctr" rotWithShape="0">
                     <a:schemeClr val="bg2">
@@ -597,7 +597,7 @@
               </a14:hiddenEffects>
             </a:ext>
             <a:ext uri="{FAA26D3D-D897-4be2-8F04-BA451C77F1D7}">
-              <ma14:placeholderFlag xmlns:ma14="http://schemas.microsoft.com/office/mac/drawingml/2011/main" xmlns="" val="1"/>
+              <ma14:placeholderFlag xmlns="" xmlns:ma14="http://schemas.microsoft.com/office/mac/drawingml/2011/main" val="1"/>
             </a:ext>
           </a:extLst>
         </p:spPr>
@@ -642,14 +642,14 @@
           <a:effectLst/>
           <a:extLst>
             <a:ext uri="{909E8E84-426E-40dd-AFC4-6F175D3DCCD1}">
-              <a14:hiddenFill xmlns:a14="http://schemas.microsoft.com/office/drawing/2010/main" xmlns="">
+              <a14:hiddenFill xmlns="" xmlns:a14="http://schemas.microsoft.com/office/drawing/2010/main">
                 <a:solidFill>
                   <a:schemeClr val="accent1"/>
                 </a:solidFill>
               </a14:hiddenFill>
             </a:ext>
             <a:ext uri="{91240B29-F687-4f45-9708-019B960494DF}">
-              <a14:hiddenLine xmlns:a14="http://schemas.microsoft.com/office/drawing/2010/main" xmlns="" w="9525">
+              <a14:hiddenLine xmlns="" xmlns:a14="http://schemas.microsoft.com/office/drawing/2010/main" w="9525">
                 <a:solidFill>
                   <a:schemeClr val="tx1"/>
                 </a:solidFill>
@@ -659,7 +659,7 @@
               </a14:hiddenLine>
             </a:ext>
             <a:ext uri="{AF507438-7753-43e0-B8FC-AC1667EBCBE1}">
-              <a14:hiddenEffects xmlns:a14="http://schemas.microsoft.com/office/drawing/2010/main" xmlns="">
+              <a14:hiddenEffects xmlns="" xmlns:a14="http://schemas.microsoft.com/office/drawing/2010/main">
                 <a:effectLst>
                   <a:outerShdw blurRad="63500" dist="38099" dir="2700000" algn="ctr" rotWithShape="0">
                     <a:schemeClr val="bg2">
@@ -670,7 +670,7 @@
               </a14:hiddenEffects>
             </a:ext>
             <a:ext uri="{FAA26D3D-D897-4be2-8F04-BA451C77F1D7}">
-              <ma14:placeholderFlag xmlns:ma14="http://schemas.microsoft.com/office/mac/drawingml/2011/main" xmlns="" val="1"/>
+              <ma14:placeholderFlag xmlns="" xmlns:ma14="http://schemas.microsoft.com/office/mac/drawingml/2011/main" val="1"/>
             </a:ext>
           </a:extLst>
         </p:spPr>
@@ -1071,7 +1071,7 @@
           <a:effectLst/>
           <a:extLst>
             <a:ext uri="{AF507438-7753-43e0-B8FC-AC1667EBCBE1}">
-              <a14:hiddenEffects xmlns:a14="http://schemas.microsoft.com/office/drawing/2010/main" xmlns="">
+              <a14:hiddenEffects xmlns="" xmlns:a14="http://schemas.microsoft.com/office/drawing/2010/main">
                 <a:effectLst>
                   <a:outerShdw blurRad="63500" dist="35921" dir="2700000" algn="ctr" rotWithShape="0">
                     <a:schemeClr val="bg2"/>
@@ -2054,14 +2054,14 @@
           <a:effectLst/>
           <a:extLst>
             <a:ext uri="{909E8E84-426E-40dd-AFC4-6F175D3DCCD1}">
-              <a14:hiddenFill xmlns:a14="http://schemas.microsoft.com/office/drawing/2010/main" xmlns="">
+              <a14:hiddenFill xmlns="" xmlns:a14="http://schemas.microsoft.com/office/drawing/2010/main">
                 <a:solidFill>
                   <a:schemeClr val="accent1"/>
                 </a:solidFill>
               </a14:hiddenFill>
             </a:ext>
             <a:ext uri="{91240B29-F687-4f45-9708-019B960494DF}">
-              <a14:hiddenLine xmlns:a14="http://schemas.microsoft.com/office/drawing/2010/main" xmlns="" w="9525">
+              <a14:hiddenLine xmlns="" xmlns:a14="http://schemas.microsoft.com/office/drawing/2010/main" w="9525">
                 <a:solidFill>
                   <a:schemeClr val="tx1"/>
                 </a:solidFill>
@@ -2071,7 +2071,7 @@
               </a14:hiddenLine>
             </a:ext>
             <a:ext uri="{AF507438-7753-43e0-B8FC-AC1667EBCBE1}">
-              <a14:hiddenEffects xmlns:a14="http://schemas.microsoft.com/office/drawing/2010/main" xmlns="">
+              <a14:hiddenEffects xmlns="" xmlns:a14="http://schemas.microsoft.com/office/drawing/2010/main">
                 <a:effectLst>
                   <a:outerShdw blurRad="63500" dist="38099" dir="2700000" algn="ctr" rotWithShape="0">
                     <a:schemeClr val="bg2">
@@ -2082,7 +2082,7 @@
               </a14:hiddenEffects>
             </a:ext>
             <a:ext uri="{FAA26D3D-D897-4be2-8F04-BA451C77F1D7}">
-              <ma14:placeholderFlag xmlns:ma14="http://schemas.microsoft.com/office/mac/drawingml/2011/main" xmlns="" val="1"/>
+              <ma14:placeholderFlag xmlns="" xmlns:ma14="http://schemas.microsoft.com/office/mac/drawingml/2011/main" val="1"/>
             </a:ext>
           </a:extLst>
         </p:spPr>
@@ -2127,14 +2127,14 @@
           <a:effectLst/>
           <a:extLst>
             <a:ext uri="{909E8E84-426E-40dd-AFC4-6F175D3DCCD1}">
-              <a14:hiddenFill xmlns:a14="http://schemas.microsoft.com/office/drawing/2010/main" xmlns="">
+              <a14:hiddenFill xmlns="" xmlns:a14="http://schemas.microsoft.com/office/drawing/2010/main">
                 <a:solidFill>
                   <a:schemeClr val="accent1"/>
                 </a:solidFill>
               </a14:hiddenFill>
             </a:ext>
             <a:ext uri="{91240B29-F687-4f45-9708-019B960494DF}">
-              <a14:hiddenLine xmlns:a14="http://schemas.microsoft.com/office/drawing/2010/main" xmlns="" w="9525">
+              <a14:hiddenLine xmlns="" xmlns:a14="http://schemas.microsoft.com/office/drawing/2010/main" w="9525">
                 <a:solidFill>
                   <a:schemeClr val="tx1"/>
                 </a:solidFill>
@@ -2144,7 +2144,7 @@
               </a14:hiddenLine>
             </a:ext>
             <a:ext uri="{AF507438-7753-43e0-B8FC-AC1667EBCBE1}">
-              <a14:hiddenEffects xmlns:a14="http://schemas.microsoft.com/office/drawing/2010/main" xmlns="">
+              <a14:hiddenEffects xmlns="" xmlns:a14="http://schemas.microsoft.com/office/drawing/2010/main">
                 <a:effectLst>
                   <a:outerShdw blurRad="63500" dist="38099" dir="2700000" algn="ctr" rotWithShape="0">
                     <a:schemeClr val="bg2">
@@ -2155,7 +2155,7 @@
               </a14:hiddenEffects>
             </a:ext>
             <a:ext uri="{FAA26D3D-D897-4be2-8F04-BA451C77F1D7}">
-              <ma14:placeholderFlag xmlns:ma14="http://schemas.microsoft.com/office/mac/drawingml/2011/main" xmlns="" val="1"/>
+              <ma14:placeholderFlag xmlns="" xmlns:ma14="http://schemas.microsoft.com/office/mac/drawingml/2011/main" val="1"/>
             </a:ext>
           </a:extLst>
         </p:spPr>
@@ -2228,14 +2228,14 @@
           <a:effectLst/>
           <a:extLst>
             <a:ext uri="{909E8E84-426E-40dd-AFC4-6F175D3DCCD1}">
-              <a14:hiddenFill xmlns:a14="http://schemas.microsoft.com/office/drawing/2010/main" xmlns="">
+              <a14:hiddenFill xmlns="" xmlns:a14="http://schemas.microsoft.com/office/drawing/2010/main">
                 <a:solidFill>
                   <a:schemeClr val="accent1"/>
                 </a:solidFill>
               </a14:hiddenFill>
             </a:ext>
             <a:ext uri="{91240B29-F687-4f45-9708-019B960494DF}">
-              <a14:hiddenLine xmlns:a14="http://schemas.microsoft.com/office/drawing/2010/main" xmlns="" w="9525">
+              <a14:hiddenLine xmlns="" xmlns:a14="http://schemas.microsoft.com/office/drawing/2010/main" w="9525">
                 <a:solidFill>
                   <a:schemeClr val="tx1"/>
                 </a:solidFill>
@@ -2245,7 +2245,7 @@
               </a14:hiddenLine>
             </a:ext>
             <a:ext uri="{AF507438-7753-43e0-B8FC-AC1667EBCBE1}">
-              <a14:hiddenEffects xmlns:a14="http://schemas.microsoft.com/office/drawing/2010/main" xmlns="">
+              <a14:hiddenEffects xmlns="" xmlns:a14="http://schemas.microsoft.com/office/drawing/2010/main">
                 <a:effectLst>
                   <a:outerShdw blurRad="63500" dist="38099" dir="2700000" algn="ctr" rotWithShape="0">
                     <a:schemeClr val="bg2">
@@ -2256,7 +2256,7 @@
               </a14:hiddenEffects>
             </a:ext>
             <a:ext uri="{FAA26D3D-D897-4be2-8F04-BA451C77F1D7}">
-              <ma14:placeholderFlag xmlns:ma14="http://schemas.microsoft.com/office/mac/drawingml/2011/main" xmlns="" val="1"/>
+              <ma14:placeholderFlag xmlns="" xmlns:ma14="http://schemas.microsoft.com/office/mac/drawingml/2011/main" val="1"/>
             </a:ext>
           </a:extLst>
         </p:spPr>
@@ -2304,14 +2304,14 @@
           <a:effectLst/>
           <a:extLst>
             <a:ext uri="{909E8E84-426E-40dd-AFC4-6F175D3DCCD1}">
-              <a14:hiddenFill xmlns:a14="http://schemas.microsoft.com/office/drawing/2010/main" xmlns="">
+              <a14:hiddenFill xmlns="" xmlns:a14="http://schemas.microsoft.com/office/drawing/2010/main">
                 <a:solidFill>
                   <a:schemeClr val="accent1"/>
                 </a:solidFill>
               </a14:hiddenFill>
             </a:ext>
             <a:ext uri="{91240B29-F687-4f45-9708-019B960494DF}">
-              <a14:hiddenLine xmlns:a14="http://schemas.microsoft.com/office/drawing/2010/main" xmlns="" w="9525">
+              <a14:hiddenLine xmlns="" xmlns:a14="http://schemas.microsoft.com/office/drawing/2010/main" w="9525">
                 <a:solidFill>
                   <a:schemeClr val="tx1"/>
                 </a:solidFill>
@@ -2321,7 +2321,7 @@
               </a14:hiddenLine>
             </a:ext>
             <a:ext uri="{AF507438-7753-43e0-B8FC-AC1667EBCBE1}">
-              <a14:hiddenEffects xmlns:a14="http://schemas.microsoft.com/office/drawing/2010/main" xmlns="">
+              <a14:hiddenEffects xmlns="" xmlns:a14="http://schemas.microsoft.com/office/drawing/2010/main">
                 <a:effectLst>
                   <a:outerShdw blurRad="63500" dist="38099" dir="2700000" algn="ctr" rotWithShape="0">
                     <a:schemeClr val="bg2">
@@ -2332,7 +2332,7 @@
               </a14:hiddenEffects>
             </a:ext>
             <a:ext uri="{FAA26D3D-D897-4be2-8F04-BA451C77F1D7}">
-              <ma14:placeholderFlag xmlns:ma14="http://schemas.microsoft.com/office/mac/drawingml/2011/main" xmlns="" val="1"/>
+              <ma14:placeholderFlag xmlns="" xmlns:ma14="http://schemas.microsoft.com/office/mac/drawingml/2011/main" val="1"/>
             </a:ext>
           </a:extLst>
         </p:spPr>
@@ -2388,14 +2388,14 @@
           <a:effectLst/>
           <a:extLst>
             <a:ext uri="{909E8E84-426E-40dd-AFC4-6F175D3DCCD1}">
-              <a14:hiddenFill xmlns:a14="http://schemas.microsoft.com/office/drawing/2010/main" xmlns="">
+              <a14:hiddenFill xmlns="" xmlns:a14="http://schemas.microsoft.com/office/drawing/2010/main">
                 <a:solidFill>
                   <a:schemeClr val="accent1"/>
                 </a:solidFill>
               </a14:hiddenFill>
             </a:ext>
             <a:ext uri="{91240B29-F687-4f45-9708-019B960494DF}">
-              <a14:hiddenLine xmlns:a14="http://schemas.microsoft.com/office/drawing/2010/main" xmlns="" w="9525">
+              <a14:hiddenLine xmlns="" xmlns:a14="http://schemas.microsoft.com/office/drawing/2010/main" w="9525">
                 <a:solidFill>
                   <a:schemeClr val="tx1"/>
                 </a:solidFill>
@@ -2405,7 +2405,7 @@
               </a14:hiddenLine>
             </a:ext>
             <a:ext uri="{AF507438-7753-43e0-B8FC-AC1667EBCBE1}">
-              <a14:hiddenEffects xmlns:a14="http://schemas.microsoft.com/office/drawing/2010/main" xmlns="">
+              <a14:hiddenEffects xmlns="" xmlns:a14="http://schemas.microsoft.com/office/drawing/2010/main">
                 <a:effectLst>
                   <a:outerShdw blurRad="63500" dist="38099" dir="2700000" algn="ctr" rotWithShape="0">
                     <a:schemeClr val="bg2">
@@ -2416,7 +2416,7 @@
               </a14:hiddenEffects>
             </a:ext>
             <a:ext uri="{FAA26D3D-D897-4be2-8F04-BA451C77F1D7}">
-              <ma14:placeholderFlag xmlns:ma14="http://schemas.microsoft.com/office/mac/drawingml/2011/main" xmlns="" val="1"/>
+              <ma14:placeholderFlag xmlns="" xmlns:ma14="http://schemas.microsoft.com/office/mac/drawingml/2011/main" val="1"/>
             </a:ext>
           </a:extLst>
         </p:spPr>
@@ -2473,12 +2473,12 @@
           <a:effectLst/>
           <a:extLst>
             <a:ext uri="{909E8E84-426E-40dd-AFC4-6F175D3DCCD1}">
-              <a14:hiddenFill xmlns:a14="http://schemas.microsoft.com/office/drawing/2010/main" xmlns="">
+              <a14:hiddenFill xmlns="" xmlns:a14="http://schemas.microsoft.com/office/drawing/2010/main">
                 <a:noFill/>
               </a14:hiddenFill>
             </a:ext>
             <a:ext uri="{AF507438-7753-43e0-B8FC-AC1667EBCBE1}">
-              <a14:hiddenEffects xmlns:a14="http://schemas.microsoft.com/office/drawing/2010/main" xmlns="">
+              <a14:hiddenEffects xmlns="" xmlns:a14="http://schemas.microsoft.com/office/drawing/2010/main">
                 <a:effectLst>
                   <a:outerShdw blurRad="63500" dist="38099" dir="2700000" algn="ctr" rotWithShape="0">
                     <a:schemeClr val="bg2">
@@ -2530,7 +2530,7 @@
           <a:noFill/>
           <a:extLst>
             <a:ext uri="{909E8E84-426E-40dd-AFC4-6F175D3DCCD1}">
-              <a14:hiddenFill xmlns:a14="http://schemas.microsoft.com/office/drawing/2010/main" xmlns="">
+              <a14:hiddenFill xmlns="" xmlns:a14="http://schemas.microsoft.com/office/drawing/2010/main">
                 <a:solidFill>
                   <a:srgbClr val="FFFFFF"/>
                 </a:solidFill>
@@ -2562,14 +2562,14 @@
           <a:effectLst/>
           <a:extLst>
             <a:ext uri="{909E8E84-426E-40dd-AFC4-6F175D3DCCD1}">
-              <a14:hiddenFill xmlns:a14="http://schemas.microsoft.com/office/drawing/2010/main" xmlns="">
+              <a14:hiddenFill xmlns="" xmlns:a14="http://schemas.microsoft.com/office/drawing/2010/main">
                 <a:solidFill>
                   <a:schemeClr val="accent1"/>
                 </a:solidFill>
               </a14:hiddenFill>
             </a:ext>
             <a:ext uri="{91240B29-F687-4f45-9708-019B960494DF}">
-              <a14:hiddenLine xmlns:a14="http://schemas.microsoft.com/office/drawing/2010/main" xmlns="" w="9525">
+              <a14:hiddenLine xmlns="" xmlns:a14="http://schemas.microsoft.com/office/drawing/2010/main" w="9525">
                 <a:solidFill>
                   <a:schemeClr val="tx1"/>
                 </a:solidFill>
@@ -2579,7 +2579,7 @@
               </a14:hiddenLine>
             </a:ext>
             <a:ext uri="{AF507438-7753-43e0-B8FC-AC1667EBCBE1}">
-              <a14:hiddenEffects xmlns:a14="http://schemas.microsoft.com/office/drawing/2010/main" xmlns="">
+              <a14:hiddenEffects xmlns="" xmlns:a14="http://schemas.microsoft.com/office/drawing/2010/main">
                 <a:effectLst>
                   <a:outerShdw blurRad="63500" dist="38099" dir="2700000" algn="ctr" rotWithShape="0">
                     <a:schemeClr val="bg2">
@@ -3689,7 +3689,7 @@
           <a:effectLst/>
           <a:extLst>
             <a:ext uri="{AF507438-7753-43e0-B8FC-AC1667EBCBE1}">
-              <a14:hiddenEffects xmlns="" xmlns:a14="http://schemas.microsoft.com/office/drawing/2010/main">
+              <a14:hiddenEffects xmlns:a14="http://schemas.microsoft.com/office/drawing/2010/main" xmlns="">
                 <a:effectLst>
                   <a:outerShdw blurRad="63500" dist="35921" dir="2700000" algn="ctr" rotWithShape="0">
                     <a:schemeClr val="bg2"/>
@@ -3771,7 +3771,7 @@
           <a:effectLst/>
           <a:extLst>
             <a:ext uri="{AF507438-7753-43e0-B8FC-AC1667EBCBE1}">
-              <a14:hiddenEffects xmlns="" xmlns:a14="http://schemas.microsoft.com/office/drawing/2010/main">
+              <a14:hiddenEffects xmlns:a14="http://schemas.microsoft.com/office/drawing/2010/main" xmlns="">
                 <a:effectLst>
                   <a:outerShdw blurRad="63500" dist="35921" dir="2700000" algn="ctr" rotWithShape="0">
                     <a:schemeClr val="bg2"/>
@@ -3853,7 +3853,7 @@
           <a:effectLst/>
           <a:extLst>
             <a:ext uri="{AF507438-7753-43e0-B8FC-AC1667EBCBE1}">
-              <a14:hiddenEffects xmlns="" xmlns:a14="http://schemas.microsoft.com/office/drawing/2010/main">
+              <a14:hiddenEffects xmlns:a14="http://schemas.microsoft.com/office/drawing/2010/main" xmlns="">
                 <a:effectLst>
                   <a:outerShdw blurRad="63500" dist="35921" dir="2700000" algn="ctr" rotWithShape="0">
                     <a:schemeClr val="bg2"/>
@@ -3935,7 +3935,7 @@
           <a:effectLst/>
           <a:extLst>
             <a:ext uri="{AF507438-7753-43e0-B8FC-AC1667EBCBE1}">
-              <a14:hiddenEffects xmlns="" xmlns:a14="http://schemas.microsoft.com/office/drawing/2010/main">
+              <a14:hiddenEffects xmlns:a14="http://schemas.microsoft.com/office/drawing/2010/main" xmlns="">
                 <a:effectLst>
                   <a:outerShdw blurRad="63500" dist="35921" dir="2700000" algn="ctr" rotWithShape="0">
                     <a:schemeClr val="bg2"/>
@@ -4017,7 +4017,7 @@
           <a:effectLst/>
           <a:extLst>
             <a:ext uri="{AF507438-7753-43e0-B8FC-AC1667EBCBE1}">
-              <a14:hiddenEffects xmlns="" xmlns:a14="http://schemas.microsoft.com/office/drawing/2010/main">
+              <a14:hiddenEffects xmlns:a14="http://schemas.microsoft.com/office/drawing/2010/main" xmlns="">
                 <a:effectLst>
                   <a:outerShdw blurRad="63500" dist="35921" dir="2700000" algn="ctr" rotWithShape="0">
                     <a:schemeClr val="bg2"/>
@@ -4099,7 +4099,7 @@
           <a:effectLst/>
           <a:extLst>
             <a:ext uri="{AF507438-7753-43e0-B8FC-AC1667EBCBE1}">
-              <a14:hiddenEffects xmlns="" xmlns:a14="http://schemas.microsoft.com/office/drawing/2010/main">
+              <a14:hiddenEffects xmlns:a14="http://schemas.microsoft.com/office/drawing/2010/main" xmlns="">
                 <a:effectLst>
                   <a:outerShdw blurRad="63500" dist="35921" dir="2700000" algn="ctr" rotWithShape="0">
                     <a:schemeClr val="bg2"/>
@@ -5011,7 +5011,7 @@
           <a:effectLst/>
           <a:extLst>
             <a:ext uri="{AF507438-7753-43e0-B8FC-AC1667EBCBE1}">
-              <a14:hiddenEffects xmlns="" xmlns:a14="http://schemas.microsoft.com/office/drawing/2010/main">
+              <a14:hiddenEffects xmlns:a14="http://schemas.microsoft.com/office/drawing/2010/main" xmlns="">
                 <a:effectLst>
                   <a:outerShdw blurRad="63500" dist="35921" dir="2700000" algn="ctr" rotWithShape="0">
                     <a:schemeClr val="bg2"/>
@@ -5093,7 +5093,7 @@
           <a:effectLst/>
           <a:extLst>
             <a:ext uri="{AF507438-7753-43e0-B8FC-AC1667EBCBE1}">
-              <a14:hiddenEffects xmlns="" xmlns:a14="http://schemas.microsoft.com/office/drawing/2010/main">
+              <a14:hiddenEffects xmlns:a14="http://schemas.microsoft.com/office/drawing/2010/main" xmlns="">
                 <a:effectLst>
                   <a:outerShdw blurRad="63500" dist="35921" dir="2700000" algn="ctr" rotWithShape="0">
                     <a:schemeClr val="bg2"/>
@@ -5175,7 +5175,7 @@
           <a:effectLst/>
           <a:extLst>
             <a:ext uri="{AF507438-7753-43e0-B8FC-AC1667EBCBE1}">
-              <a14:hiddenEffects xmlns="" xmlns:a14="http://schemas.microsoft.com/office/drawing/2010/main">
+              <a14:hiddenEffects xmlns:a14="http://schemas.microsoft.com/office/drawing/2010/main" xmlns="">
                 <a:effectLst>
                   <a:outerShdw blurRad="63500" dist="35921" dir="2700000" algn="ctr" rotWithShape="0">
                     <a:schemeClr val="bg2"/>
@@ -5257,7 +5257,7 @@
           <a:effectLst/>
           <a:extLst>
             <a:ext uri="{AF507438-7753-43e0-B8FC-AC1667EBCBE1}">
-              <a14:hiddenEffects xmlns="" xmlns:a14="http://schemas.microsoft.com/office/drawing/2010/main">
+              <a14:hiddenEffects xmlns:a14="http://schemas.microsoft.com/office/drawing/2010/main" xmlns="">
                 <a:effectLst>
                   <a:outerShdw blurRad="63500" dist="35921" dir="2700000" algn="ctr" rotWithShape="0">
                     <a:schemeClr val="bg2"/>
@@ -5339,7 +5339,7 @@
           <a:effectLst/>
           <a:extLst>
             <a:ext uri="{AF507438-7753-43e0-B8FC-AC1667EBCBE1}">
-              <a14:hiddenEffects xmlns="" xmlns:a14="http://schemas.microsoft.com/office/drawing/2010/main">
+              <a14:hiddenEffects xmlns:a14="http://schemas.microsoft.com/office/drawing/2010/main" xmlns="">
                 <a:effectLst>
                   <a:outerShdw blurRad="63500" dist="35921" dir="2700000" algn="ctr" rotWithShape="0">
                     <a:schemeClr val="bg2"/>
@@ -5421,7 +5421,7 @@
           <a:effectLst/>
           <a:extLst>
             <a:ext uri="{AF507438-7753-43e0-B8FC-AC1667EBCBE1}">
-              <a14:hiddenEffects xmlns="" xmlns:a14="http://schemas.microsoft.com/office/drawing/2010/main">
+              <a14:hiddenEffects xmlns:a14="http://schemas.microsoft.com/office/drawing/2010/main" xmlns="">
                 <a:effectLst>
                   <a:outerShdw blurRad="63500" dist="35921" dir="2700000" algn="ctr" rotWithShape="0">
                     <a:schemeClr val="bg2"/>
@@ -7495,7 +7495,7 @@
             <p:ph idx="1"/>
             <p:extLst>
               <p:ext uri="{D42A27DB-BD31-4B8C-83A1-F6EECF244321}">
-                <p14:modId xmlns:p14="http://schemas.microsoft.com/office/powerpoint/2010/main" val="3845184172"/>
+                <p14:modId xmlns:p14="http://schemas.microsoft.com/office/powerpoint/2010/main" val="3804858998"/>
               </p:ext>
             </p:extLst>
           </p:nvPr>
@@ -7695,9 +7695,10 @@
                     <a:lstStyle/>
                     <a:p>
                       <a:r>
-                        <a:rPr lang="de-CH" dirty="0"/>
-                        <a:t>54.60%</a:t>
-                      </a:r>
+                        <a:rPr lang="de-CH"/>
+                        <a:t>56.08%</a:t>
+                      </a:r>
+                      <a:endParaRPr lang="de-CH" dirty="0"/>
                     </a:p>
                   </a:txBody>
                   <a:tcPr/>
@@ -9481,7 +9482,7 @@
         <a:effectLst/>
         <a:extLst>
           <a:ext uri="{AF507438-7753-43e0-B8FC-AC1667EBCBE1}">
-            <a14:hiddenEffects xmlns:a14="http://schemas.microsoft.com/office/drawing/2010/main" xmlns="">
+            <a14:hiddenEffects xmlns="" xmlns:a14="http://schemas.microsoft.com/office/drawing/2010/main">
               <a:effectLst>
                 <a:outerShdw blurRad="63500" dist="35921" dir="2700000" algn="ctr" rotWithShape="0">
                   <a:schemeClr val="bg2"/>
@@ -9556,7 +9557,7 @@
         <a:effectLst/>
         <a:extLst>
           <a:ext uri="{AF507438-7753-43e0-B8FC-AC1667EBCBE1}">
-            <a14:hiddenEffects xmlns:a14="http://schemas.microsoft.com/office/drawing/2010/main" xmlns="">
+            <a14:hiddenEffects xmlns="" xmlns:a14="http://schemas.microsoft.com/office/drawing/2010/main">
               <a:effectLst>
                 <a:outerShdw blurRad="63500" dist="35921" dir="2700000" algn="ctr" rotWithShape="0">
                   <a:schemeClr val="bg2"/>

</xml_diff>